<commit_message>
Added related work slides. Added PDF version.
</commit_message>
<xml_diff>
--- a/final_presentation/final_presentation.pptx
+++ b/final_presentation/final_presentation.pptx
@@ -128,7 +128,7 @@
   </p:defaultTextStyle>
   <p:extLst>
     <p:ext uri="{EFAFB233-063F-42B5-8137-9DF3F51BA10A}">
-      <p15:sldGuideLst xmlns="" xmlns:p15="http://schemas.microsoft.com/office/powerpoint/2012/main">
+      <p15:sldGuideLst xmlns:p15="http://schemas.microsoft.com/office/powerpoint/2012/main">
         <p15:guide id="1" orient="horz" pos="2160">
           <p15:clr>
             <a:srgbClr val="A4A3A4"/>
@@ -803,7 +803,7 @@
           <a:p>
             <a:fld id="{D8241D4F-CEAE-4E87-BB6C-9D1407A62382}" type="datetimeFigureOut">
               <a:rPr lang="en-US" smtClean="0"/>
-              <a:t>5/1/2015</a:t>
+              <a:t>5/2/2015</a:t>
             </a:fld>
             <a:endParaRPr lang="en-US"/>
           </a:p>
@@ -986,7 +986,7 @@
           <a:p>
             <a:fld id="{D8241D4F-CEAE-4E87-BB6C-9D1407A62382}" type="datetimeFigureOut">
               <a:rPr lang="en-US" smtClean="0"/>
-              <a:t>5/1/2015</a:t>
+              <a:t>5/2/2015</a:t>
             </a:fld>
             <a:endParaRPr lang="en-US"/>
           </a:p>
@@ -1161,7 +1161,7 @@
           <a:p>
             <a:fld id="{D8241D4F-CEAE-4E87-BB6C-9D1407A62382}" type="datetimeFigureOut">
               <a:rPr lang="en-US" smtClean="0"/>
-              <a:t>5/1/2015</a:t>
+              <a:t>5/2/2015</a:t>
             </a:fld>
             <a:endParaRPr lang="en-US"/>
           </a:p>
@@ -1326,7 +1326,7 @@
           <a:p>
             <a:fld id="{D8241D4F-CEAE-4E87-BB6C-9D1407A62382}" type="datetimeFigureOut">
               <a:rPr lang="en-US" smtClean="0"/>
-              <a:t>5/1/2015</a:t>
+              <a:t>5/2/2015</a:t>
             </a:fld>
             <a:endParaRPr lang="en-US"/>
           </a:p>
@@ -1547,7 +1547,7 @@
           <a:p>
             <a:fld id="{D8241D4F-CEAE-4E87-BB6C-9D1407A62382}" type="datetimeFigureOut">
               <a:rPr lang="en-US" smtClean="0"/>
-              <a:t>5/1/2015</a:t>
+              <a:t>5/2/2015</a:t>
             </a:fld>
             <a:endParaRPr lang="en-US"/>
           </a:p>
@@ -1806,7 +1806,7 @@
           <a:p>
             <a:fld id="{D8241D4F-CEAE-4E87-BB6C-9D1407A62382}" type="datetimeFigureOut">
               <a:rPr lang="en-US" smtClean="0"/>
-              <a:t>5/1/2015</a:t>
+              <a:t>5/2/2015</a:t>
             </a:fld>
             <a:endParaRPr lang="en-US"/>
           </a:p>
@@ -2210,7 +2210,7 @@
           <a:p>
             <a:fld id="{D8241D4F-CEAE-4E87-BB6C-9D1407A62382}" type="datetimeFigureOut">
               <a:rPr lang="en-US" smtClean="0"/>
-              <a:t>5/1/2015</a:t>
+              <a:t>5/2/2015</a:t>
             </a:fld>
             <a:endParaRPr lang="en-US"/>
           </a:p>
@@ -2341,7 +2341,7 @@
           <a:p>
             <a:fld id="{D8241D4F-CEAE-4E87-BB6C-9D1407A62382}" type="datetimeFigureOut">
               <a:rPr lang="en-US" smtClean="0"/>
-              <a:t>5/1/2015</a:t>
+              <a:t>5/2/2015</a:t>
             </a:fld>
             <a:endParaRPr lang="en-US"/>
           </a:p>
@@ -2441,7 +2441,7 @@
           <a:p>
             <a:fld id="{D8241D4F-CEAE-4E87-BB6C-9D1407A62382}" type="datetimeFigureOut">
               <a:rPr lang="en-US" smtClean="0"/>
-              <a:t>5/1/2015</a:t>
+              <a:t>5/2/2015</a:t>
             </a:fld>
             <a:endParaRPr lang="en-US"/>
           </a:p>
@@ -2686,7 +2686,7 @@
           <a:p>
             <a:fld id="{D8241D4F-CEAE-4E87-BB6C-9D1407A62382}" type="datetimeFigureOut">
               <a:rPr lang="en-US" smtClean="0"/>
-              <a:t>5/1/2015</a:t>
+              <a:t>5/2/2015</a:t>
             </a:fld>
             <a:endParaRPr lang="en-US"/>
           </a:p>
@@ -2930,7 +2930,7 @@
           <a:p>
             <a:fld id="{D8241D4F-CEAE-4E87-BB6C-9D1407A62382}" type="datetimeFigureOut">
               <a:rPr lang="en-US" smtClean="0"/>
-              <a:t>5/1/2015</a:t>
+              <a:t>5/2/2015</a:t>
             </a:fld>
             <a:endParaRPr lang="en-US"/>
           </a:p>
@@ -3754,7 +3754,7 @@
           <a:p>
             <a:fld id="{D8241D4F-CEAE-4E87-BB6C-9D1407A62382}" type="datetimeFigureOut">
               <a:rPr lang="en-US" smtClean="0"/>
-              <a:t>5/1/2015</a:t>
+              <a:t>5/2/2015</a:t>
             </a:fld>
             <a:endParaRPr lang="en-US"/>
           </a:p>
@@ -4163,15 +4163,7 @@
           <a:p>
             <a:r>
               <a:rPr lang="en-US" dirty="0" smtClean="0"/>
-              <a:t>Defending Against </a:t>
-            </a:r>
-            <a:r>
-              <a:rPr lang="en-US" dirty="0" smtClean="0"/>
-              <a:t>Black Hole </a:t>
-            </a:r>
-            <a:r>
-              <a:rPr lang="en-US" dirty="0" smtClean="0"/>
-              <a:t>Attacks on AODV Routing</a:t>
+              <a:t>Defending Against Black Hole Attacks on AODV Routing</a:t>
             </a:r>
             <a:endParaRPr lang="en-US" dirty="0"/>
           </a:p>
@@ -4661,7 +4653,54 @@
           <a:bodyPr/>
           <a:lstStyle/>
           <a:p>
-            <a:endParaRPr lang="en-US"/>
+            <a:r>
+              <a:rPr lang="en-US" dirty="0" smtClean="0"/>
+              <a:t>Authentication based solutions:</a:t>
+            </a:r>
+          </a:p>
+          <a:p>
+            <a:pPr lvl="1"/>
+            <a:r>
+              <a:rPr lang="en-US" dirty="0" smtClean="0"/>
+              <a:t>Examples:</a:t>
+            </a:r>
+            <a:r>
+              <a:rPr lang="en-US" dirty="0" smtClean="0"/>
+              <a:t> Adriane, ARAN</a:t>
+            </a:r>
+          </a:p>
+          <a:p>
+            <a:pPr lvl="1"/>
+            <a:r>
+              <a:rPr lang="en-US" dirty="0" smtClean="0"/>
+              <a:t>Add encryption to message passing.</a:t>
+            </a:r>
+            <a:endParaRPr lang="en-US" dirty="0" smtClean="0"/>
+          </a:p>
+          <a:p>
+            <a:pPr lvl="1"/>
+            <a:r>
+              <a:rPr lang="en-US" dirty="0" smtClean="0"/>
+              <a:t>Allows for very secure communication.</a:t>
+            </a:r>
+          </a:p>
+          <a:p>
+            <a:pPr lvl="1"/>
+            <a:r>
+              <a:rPr lang="en-US" dirty="0" smtClean="0"/>
+              <a:t>Increases computational overhead on participating nodes.</a:t>
+            </a:r>
+          </a:p>
+          <a:p>
+            <a:pPr lvl="1"/>
+            <a:r>
+              <a:rPr lang="en-US" dirty="0" smtClean="0"/>
+              <a:t>Some methods also require centralized authentication.</a:t>
+            </a:r>
+            <a:endParaRPr lang="en-US" dirty="0" smtClean="0"/>
+          </a:p>
+          <a:p>
+            <a:endParaRPr lang="en-US" dirty="0"/>
           </a:p>
         </p:txBody>
       </p:sp>
@@ -4738,7 +4777,33 @@
           <a:bodyPr/>
           <a:lstStyle/>
           <a:p>
-            <a:endParaRPr lang="en-US"/>
+            <a:r>
+              <a:rPr lang="en-US" dirty="0" smtClean="0"/>
+              <a:t>Statistical intrusion detection systems:</a:t>
+            </a:r>
+          </a:p>
+          <a:p>
+            <a:pPr lvl="1"/>
+            <a:r>
+              <a:rPr lang="en-US" dirty="0" smtClean="0"/>
+              <a:t>Monitor normal packet loss due to network congestion.</a:t>
+            </a:r>
+            <a:endParaRPr lang="en-US" dirty="0" smtClean="0"/>
+          </a:p>
+          <a:p>
+            <a:pPr lvl="1"/>
+            <a:r>
+              <a:rPr lang="en-US" dirty="0" smtClean="0"/>
+              <a:t>Differentiates between normal loss and malicious packet dropping.</a:t>
+            </a:r>
+          </a:p>
+          <a:p>
+            <a:pPr lvl="1"/>
+            <a:r>
+              <a:rPr lang="en-US" dirty="0" smtClean="0"/>
+              <a:t>Requires consistent, heavy traffic which might not be present in a lightweight ad hoc network.</a:t>
+            </a:r>
+            <a:endParaRPr lang="en-US" dirty="0"/>
           </a:p>
         </p:txBody>
       </p:sp>
@@ -4815,7 +4880,39 @@
           <a:bodyPr/>
           <a:lstStyle/>
           <a:p>
-            <a:endParaRPr lang="en-US"/>
+            <a:r>
+              <a:rPr lang="en-US" dirty="0" smtClean="0"/>
+              <a:t>Intrusion detection systems via network monitoring devices:</a:t>
+            </a:r>
+          </a:p>
+          <a:p>
+            <a:pPr lvl="1"/>
+            <a:r>
+              <a:rPr lang="en-US" dirty="0" smtClean="0"/>
+              <a:t>Strategically placed devices observe network traffic to identify abnormal behavior.</a:t>
+            </a:r>
+          </a:p>
+          <a:p>
+            <a:pPr lvl="1"/>
+            <a:r>
+              <a:rPr lang="en-US" dirty="0" smtClean="0"/>
+              <a:t>Nodes identified as abnormal are communicated to legitimate nodes and avoided.</a:t>
+            </a:r>
+          </a:p>
+          <a:p>
+            <a:pPr lvl="1"/>
+            <a:r>
+              <a:rPr lang="en-US" dirty="0" smtClean="0"/>
+              <a:t>This can work well for static networks where security is extremely important.</a:t>
+            </a:r>
+          </a:p>
+          <a:p>
+            <a:pPr lvl="1"/>
+            <a:r>
+              <a:rPr lang="en-US" dirty="0" smtClean="0"/>
+              <a:t>Not suited for truly dynamic ad hoc networks.</a:t>
+            </a:r>
+            <a:endParaRPr lang="en-US" dirty="0"/>
           </a:p>
         </p:txBody>
       </p:sp>
@@ -6315,13 +6412,8 @@
           <a:p>
             <a:r>
               <a:rPr lang="en-US" dirty="0" smtClean="0"/>
-              <a:t>Simulation ends after a fixed period of </a:t>
-            </a:r>
-            <a:r>
-              <a:rPr lang="en-US" dirty="0" smtClean="0"/>
-              <a:t>time or fixed number of messages.</a:t>
-            </a:r>
-            <a:endParaRPr lang="en-US" dirty="0" smtClean="0"/>
+              <a:t>Simulation ends after a fixed period of time or fixed number of messages.</a:t>
+            </a:r>
           </a:p>
         </p:txBody>
       </p:sp>
@@ -7086,7 +7178,6 @@
               <a:rPr lang="en-US" dirty="0"/>
               <a:t>. Zhou and Z. Haas. Securing ad hoc networks. Network, IEEE, 13(6):24–30, Nov 1999. </a:t>
             </a:r>
-            <a:endParaRPr lang="en-US" dirty="0"/>
           </a:p>
         </p:txBody>
       </p:sp>
@@ -7174,15 +7265,7 @@
           <a:p>
             <a:r>
               <a:rPr lang="en-US" dirty="0" smtClean="0"/>
-              <a:t>Images </a:t>
-            </a:r>
-            <a:r>
-              <a:rPr lang="en-US" dirty="0" smtClean="0"/>
-              <a:t>from </a:t>
-            </a:r>
-            <a:r>
-              <a:rPr lang="en-US" dirty="0" smtClean="0"/>
-              <a:t>openclipart.org</a:t>
+              <a:t>Images from openclipart.org</a:t>
             </a:r>
             <a:endParaRPr lang="en-US" dirty="0"/>
           </a:p>
@@ -11418,11 +11501,7 @@
             </a:r>
             <a:r>
               <a:rPr lang="en-US" dirty="0" smtClean="0"/>
-              <a:t> </a:t>
-            </a:r>
-            <a:r>
-              <a:rPr lang="en-US" dirty="0" smtClean="0"/>
-              <a:t>or </a:t>
+              <a:t> or </a:t>
             </a:r>
             <a:r>
               <a:rPr lang="en-US" dirty="0" smtClean="0">
@@ -11434,11 +11513,7 @@
             </a:r>
             <a:r>
               <a:rPr lang="en-US" dirty="0" smtClean="0"/>
-              <a:t> by </a:t>
-            </a:r>
-            <a:r>
-              <a:rPr lang="en-US" dirty="0" smtClean="0"/>
-              <a:t>an adversary. </a:t>
+              <a:t> by an adversary. </a:t>
             </a:r>
             <a:r>
               <a:rPr lang="en-US" i="1" dirty="0" smtClean="0"/>
@@ -12328,11 +12403,7 @@
             </a:r>
             <a:r>
               <a:rPr lang="en-US" dirty="0" smtClean="0"/>
-              <a:t> </a:t>
-            </a:r>
-            <a:r>
-              <a:rPr lang="en-US" dirty="0" smtClean="0"/>
-              <a:t>creates a tunnel using long-range directional antennas (to offer the shortest path for many routes).</a:t>
+              <a:t> creates a tunnel using long-range directional antennas (to offer the shortest path for many routes).</a:t>
             </a:r>
             <a:endParaRPr lang="en-US" dirty="0"/>
           </a:p>

</xml_diff>